<commit_message>
Update to 2.3 with better no user
</commit_message>
<xml_diff>
--- a/Assets/logo/New Microsoft PowerPoint Presentation.pptx
+++ b/Assets/logo/New Microsoft PowerPoint Presentation.pptx
@@ -13,11 +13,12 @@
     <p:sldId id="261" r:id="rId7"/>
     <p:sldId id="262" r:id="rId8"/>
     <p:sldId id="263" r:id="rId9"/>
+    <p:sldId id="264" r:id="rId10"/>
   </p:sldIdLst>
   <p:sldSz cx="12192000" cy="6858000"/>
   <p:notesSz cx="6858000" cy="9144000"/>
   <p:custDataLst>
-    <p:tags r:id="rId10"/>
+    <p:tags r:id="rId11"/>
   </p:custDataLst>
   <p:defaultTextStyle>
     <a:defPPr>
@@ -253,7 +254,7 @@
           <a:p>
             <a:fld id="{8D698CF4-9CDE-495D-BBD8-B9B442904B8E}" type="datetimeFigureOut">
               <a:rPr lang="en-NZ" smtClean="0"/>
-              <a:t>23/08/2022</a:t>
+              <a:t>6/07/2023</a:t>
             </a:fld>
             <a:endParaRPr lang="en-NZ"/>
           </a:p>
@@ -423,7 +424,7 @@
           <a:p>
             <a:fld id="{8D698CF4-9CDE-495D-BBD8-B9B442904B8E}" type="datetimeFigureOut">
               <a:rPr lang="en-NZ" smtClean="0"/>
-              <a:t>23/08/2022</a:t>
+              <a:t>6/07/2023</a:t>
             </a:fld>
             <a:endParaRPr lang="en-NZ"/>
           </a:p>
@@ -603,7 +604,7 @@
           <a:p>
             <a:fld id="{8D698CF4-9CDE-495D-BBD8-B9B442904B8E}" type="datetimeFigureOut">
               <a:rPr lang="en-NZ" smtClean="0"/>
-              <a:t>23/08/2022</a:t>
+              <a:t>6/07/2023</a:t>
             </a:fld>
             <a:endParaRPr lang="en-NZ"/>
           </a:p>
@@ -773,7 +774,7 @@
           <a:p>
             <a:fld id="{8D698CF4-9CDE-495D-BBD8-B9B442904B8E}" type="datetimeFigureOut">
               <a:rPr lang="en-NZ" smtClean="0"/>
-              <a:t>23/08/2022</a:t>
+              <a:t>6/07/2023</a:t>
             </a:fld>
             <a:endParaRPr lang="en-NZ"/>
           </a:p>
@@ -1019,7 +1020,7 @@
           <a:p>
             <a:fld id="{8D698CF4-9CDE-495D-BBD8-B9B442904B8E}" type="datetimeFigureOut">
               <a:rPr lang="en-NZ" smtClean="0"/>
-              <a:t>23/08/2022</a:t>
+              <a:t>6/07/2023</a:t>
             </a:fld>
             <a:endParaRPr lang="en-NZ"/>
           </a:p>
@@ -1251,7 +1252,7 @@
           <a:p>
             <a:fld id="{8D698CF4-9CDE-495D-BBD8-B9B442904B8E}" type="datetimeFigureOut">
               <a:rPr lang="en-NZ" smtClean="0"/>
-              <a:t>23/08/2022</a:t>
+              <a:t>6/07/2023</a:t>
             </a:fld>
             <a:endParaRPr lang="en-NZ"/>
           </a:p>
@@ -1618,7 +1619,7 @@
           <a:p>
             <a:fld id="{8D698CF4-9CDE-495D-BBD8-B9B442904B8E}" type="datetimeFigureOut">
               <a:rPr lang="en-NZ" smtClean="0"/>
-              <a:t>23/08/2022</a:t>
+              <a:t>6/07/2023</a:t>
             </a:fld>
             <a:endParaRPr lang="en-NZ"/>
           </a:p>
@@ -1736,7 +1737,7 @@
           <a:p>
             <a:fld id="{8D698CF4-9CDE-495D-BBD8-B9B442904B8E}" type="datetimeFigureOut">
               <a:rPr lang="en-NZ" smtClean="0"/>
-              <a:t>23/08/2022</a:t>
+              <a:t>6/07/2023</a:t>
             </a:fld>
             <a:endParaRPr lang="en-NZ"/>
           </a:p>
@@ -1831,7 +1832,7 @@
           <a:p>
             <a:fld id="{8D698CF4-9CDE-495D-BBD8-B9B442904B8E}" type="datetimeFigureOut">
               <a:rPr lang="en-NZ" smtClean="0"/>
-              <a:t>23/08/2022</a:t>
+              <a:t>6/07/2023</a:t>
             </a:fld>
             <a:endParaRPr lang="en-NZ"/>
           </a:p>
@@ -2108,7 +2109,7 @@
           <a:p>
             <a:fld id="{8D698CF4-9CDE-495D-BBD8-B9B442904B8E}" type="datetimeFigureOut">
               <a:rPr lang="en-NZ" smtClean="0"/>
-              <a:t>23/08/2022</a:t>
+              <a:t>6/07/2023</a:t>
             </a:fld>
             <a:endParaRPr lang="en-NZ"/>
           </a:p>
@@ -2361,7 +2362,7 @@
           <a:p>
             <a:fld id="{8D698CF4-9CDE-495D-BBD8-B9B442904B8E}" type="datetimeFigureOut">
               <a:rPr lang="en-NZ" smtClean="0"/>
-              <a:t>23/08/2022</a:t>
+              <a:t>6/07/2023</a:t>
             </a:fld>
             <a:endParaRPr lang="en-NZ"/>
           </a:p>
@@ -2574,7 +2575,7 @@
           <a:p>
             <a:fld id="{8D698CF4-9CDE-495D-BBD8-B9B442904B8E}" type="datetimeFigureOut">
               <a:rPr lang="en-NZ" smtClean="0"/>
-              <a:t>23/08/2022</a:t>
+              <a:t>6/07/2023</a:t>
             </a:fld>
             <a:endParaRPr lang="en-NZ"/>
           </a:p>
@@ -4157,9 +4158,134 @@
 </p:sld>
 </file>
 
+<file path=ppt/slides/slide9.xml><?xml version="1.0" encoding="utf-8"?>
+<p:sld xmlns:a="http://schemas.openxmlformats.org/drawingml/2006/main" xmlns:r="http://schemas.openxmlformats.org/officeDocument/2006/relationships" xmlns:p="http://schemas.openxmlformats.org/presentationml/2006/main">
+  <p:cSld>
+    <p:spTree>
+      <p:nvGrpSpPr>
+        <p:cNvPr id="1" name=""/>
+        <p:cNvGrpSpPr/>
+        <p:nvPr/>
+      </p:nvGrpSpPr>
+      <p:grpSpPr>
+        <a:xfrm>
+          <a:off x="0" y="0"/>
+          <a:ext cx="0" cy="0"/>
+          <a:chOff x="0" y="0"/>
+          <a:chExt cx="0" cy="0"/>
+        </a:xfrm>
+      </p:grpSpPr>
+      <p:sp>
+        <p:nvSpPr>
+          <p:cNvPr id="2" name="Title 1">
+            <a:extLst>
+              <a:ext uri="{FF2B5EF4-FFF2-40B4-BE49-F238E27FC236}">
+                <a16:creationId xmlns:a16="http://schemas.microsoft.com/office/drawing/2014/main" id="{26E63FBC-8E61-0F88-B873-2603068306EC}"/>
+              </a:ext>
+            </a:extLst>
+          </p:cNvPr>
+          <p:cNvSpPr>
+            <a:spLocks noGrp="1"/>
+          </p:cNvSpPr>
+          <p:nvPr>
+            <p:ph type="title"/>
+          </p:nvPr>
+        </p:nvSpPr>
+        <p:spPr/>
+        <p:txBody>
+          <a:bodyPr/>
+          <a:lstStyle/>
+          <a:p>
+            <a:endParaRPr lang="en-NZ"/>
+          </a:p>
+        </p:txBody>
+      </p:sp>
+      <p:sp>
+        <p:nvSpPr>
+          <p:cNvPr id="3" name="Content Placeholder 2">
+            <a:extLst>
+              <a:ext uri="{FF2B5EF4-FFF2-40B4-BE49-F238E27FC236}">
+                <a16:creationId xmlns:a16="http://schemas.microsoft.com/office/drawing/2014/main" id="{6790FB1A-53D0-05A2-C9A9-A7B5650BE588}"/>
+              </a:ext>
+            </a:extLst>
+          </p:cNvPr>
+          <p:cNvSpPr>
+            <a:spLocks noGrp="1"/>
+          </p:cNvSpPr>
+          <p:nvPr>
+            <p:ph idx="1"/>
+          </p:nvPr>
+        </p:nvSpPr>
+        <p:spPr/>
+        <p:txBody>
+          <a:bodyPr/>
+          <a:lstStyle/>
+          <a:p>
+            <a:endParaRPr lang="en-NZ" dirty="0"/>
+          </a:p>
+        </p:txBody>
+      </p:sp>
+      <p:pic>
+        <p:nvPicPr>
+          <p:cNvPr id="4" name="Content Placeholder 3">
+            <a:extLst>
+              <a:ext uri="{FF2B5EF4-FFF2-40B4-BE49-F238E27FC236}">
+                <a16:creationId xmlns:a16="http://schemas.microsoft.com/office/drawing/2014/main" id="{85D18E8B-867C-41AD-3E2C-DD3164850694}"/>
+              </a:ext>
+            </a:extLst>
+          </p:cNvPr>
+          <p:cNvPicPr>
+            <a:picLocks noChangeAspect="1"/>
+          </p:cNvPicPr>
+          <p:nvPr/>
+        </p:nvPicPr>
+        <p:blipFill rotWithShape="1">
+          <a:blip r:embed="rId2">
+            <a:clrChange>
+              <a:clrFrom>
+                <a:srgbClr val="FFFFFF"/>
+              </a:clrFrom>
+              <a:clrTo>
+                <a:srgbClr val="FFFFFF">
+                  <a:alpha val="0"/>
+                </a:srgbClr>
+              </a:clrTo>
+            </a:clrChange>
+            <a:extLst>
+              <a:ext uri="{28A0092B-C50C-407E-A947-70E740481C1C}">
+                <a14:useLocalDpi xmlns:a14="http://schemas.microsoft.com/office/drawing/2010/main" val="0"/>
+              </a:ext>
+            </a:extLst>
+          </a:blip>
+          <a:srcRect r="63303"/>
+          <a:stretch/>
+        </p:blipFill>
+        <p:spPr>
+          <a:xfrm>
+            <a:off x="838200" y="1690688"/>
+            <a:ext cx="6063114" cy="4061836"/>
+          </a:xfrm>
+          <a:prstGeom prst="rect">
+            <a:avLst/>
+          </a:prstGeom>
+        </p:spPr>
+      </p:pic>
+    </p:spTree>
+    <p:extLst>
+      <p:ext uri="{BB962C8B-B14F-4D97-AF65-F5344CB8AC3E}">
+        <p14:creationId xmlns:p14="http://schemas.microsoft.com/office/powerpoint/2010/main" val="1413516508"/>
+      </p:ext>
+    </p:extLst>
+  </p:cSld>
+  <p:clrMapOvr>
+    <a:masterClrMapping/>
+  </p:clrMapOvr>
+</p:sld>
+</file>
+
 <file path=ppt/tags/tag1.xml><?xml version="1.0" encoding="utf-8"?>
 <p:tagLst xmlns:a="http://schemas.openxmlformats.org/drawingml/2006/main" xmlns:r="http://schemas.openxmlformats.org/officeDocument/2006/relationships" xmlns:p="http://schemas.openxmlformats.org/presentationml/2006/main">
-  <p:tag name="PRESGUID" val="cee0d0b6-e8de-4ba4-bcc4-b5dfed85fc67"/>
+  <p:tag name="PRESGUID" val="1012eaa4-dc71-4a63-8863-82b235555f86"/>
 </p:tagLst>
 </file>
 

</xml_diff>

<commit_message>
Add new assets and update UI/image navigation
Added Inter-Regular font assets, new logo images, and updated related meta files. Enhanced ChangePicture.cs to support left/right arrow image navigation and improved scene transition logic. Updated DistortionMat.mat defaults and VSCode workspace settings for Unity development. Removed obsolete logo and adjusted UI canvas handling for better runtime/intro separation.
</commit_message>
<xml_diff>
--- a/Assets/logo/New Microsoft PowerPoint Presentation.pptx
+++ b/Assets/logo/New Microsoft PowerPoint Presentation.pptx
@@ -10,15 +10,14 @@
     <p:sldId id="258" r:id="rId4"/>
     <p:sldId id="259" r:id="rId5"/>
     <p:sldId id="260" r:id="rId6"/>
-    <p:sldId id="261" r:id="rId7"/>
-    <p:sldId id="262" r:id="rId8"/>
-    <p:sldId id="263" r:id="rId9"/>
-    <p:sldId id="264" r:id="rId10"/>
+    <p:sldId id="265" r:id="rId7"/>
+    <p:sldId id="263" r:id="rId8"/>
+    <p:sldId id="264" r:id="rId9"/>
   </p:sldIdLst>
   <p:sldSz cx="12192000" cy="6858000"/>
   <p:notesSz cx="6858000" cy="9144000"/>
   <p:custDataLst>
-    <p:tags r:id="rId11"/>
+    <p:tags r:id="rId10"/>
   </p:custDataLst>
   <p:defaultTextStyle>
     <a:defPPr>
@@ -254,7 +253,7 @@
           <a:p>
             <a:fld id="{8D698CF4-9CDE-495D-BBD8-B9B442904B8E}" type="datetimeFigureOut">
               <a:rPr lang="en-NZ" smtClean="0"/>
-              <a:t>6/07/2023</a:t>
+              <a:t>21/11/2025</a:t>
             </a:fld>
             <a:endParaRPr lang="en-NZ"/>
           </a:p>
@@ -424,7 +423,7 @@
           <a:p>
             <a:fld id="{8D698CF4-9CDE-495D-BBD8-B9B442904B8E}" type="datetimeFigureOut">
               <a:rPr lang="en-NZ" smtClean="0"/>
-              <a:t>6/07/2023</a:t>
+              <a:t>21/11/2025</a:t>
             </a:fld>
             <a:endParaRPr lang="en-NZ"/>
           </a:p>
@@ -604,7 +603,7 @@
           <a:p>
             <a:fld id="{8D698CF4-9CDE-495D-BBD8-B9B442904B8E}" type="datetimeFigureOut">
               <a:rPr lang="en-NZ" smtClean="0"/>
-              <a:t>6/07/2023</a:t>
+              <a:t>21/11/2025</a:t>
             </a:fld>
             <a:endParaRPr lang="en-NZ"/>
           </a:p>
@@ -774,7 +773,7 @@
           <a:p>
             <a:fld id="{8D698CF4-9CDE-495D-BBD8-B9B442904B8E}" type="datetimeFigureOut">
               <a:rPr lang="en-NZ" smtClean="0"/>
-              <a:t>6/07/2023</a:t>
+              <a:t>21/11/2025</a:t>
             </a:fld>
             <a:endParaRPr lang="en-NZ"/>
           </a:p>
@@ -1020,7 +1019,7 @@
           <a:p>
             <a:fld id="{8D698CF4-9CDE-495D-BBD8-B9B442904B8E}" type="datetimeFigureOut">
               <a:rPr lang="en-NZ" smtClean="0"/>
-              <a:t>6/07/2023</a:t>
+              <a:t>21/11/2025</a:t>
             </a:fld>
             <a:endParaRPr lang="en-NZ"/>
           </a:p>
@@ -1252,7 +1251,7 @@
           <a:p>
             <a:fld id="{8D698CF4-9CDE-495D-BBD8-B9B442904B8E}" type="datetimeFigureOut">
               <a:rPr lang="en-NZ" smtClean="0"/>
-              <a:t>6/07/2023</a:t>
+              <a:t>21/11/2025</a:t>
             </a:fld>
             <a:endParaRPr lang="en-NZ"/>
           </a:p>
@@ -1619,7 +1618,7 @@
           <a:p>
             <a:fld id="{8D698CF4-9CDE-495D-BBD8-B9B442904B8E}" type="datetimeFigureOut">
               <a:rPr lang="en-NZ" smtClean="0"/>
-              <a:t>6/07/2023</a:t>
+              <a:t>21/11/2025</a:t>
             </a:fld>
             <a:endParaRPr lang="en-NZ"/>
           </a:p>
@@ -1737,7 +1736,7 @@
           <a:p>
             <a:fld id="{8D698CF4-9CDE-495D-BBD8-B9B442904B8E}" type="datetimeFigureOut">
               <a:rPr lang="en-NZ" smtClean="0"/>
-              <a:t>6/07/2023</a:t>
+              <a:t>21/11/2025</a:t>
             </a:fld>
             <a:endParaRPr lang="en-NZ"/>
           </a:p>
@@ -1832,7 +1831,7 @@
           <a:p>
             <a:fld id="{8D698CF4-9CDE-495D-BBD8-B9B442904B8E}" type="datetimeFigureOut">
               <a:rPr lang="en-NZ" smtClean="0"/>
-              <a:t>6/07/2023</a:t>
+              <a:t>21/11/2025</a:t>
             </a:fld>
             <a:endParaRPr lang="en-NZ"/>
           </a:p>
@@ -2109,7 +2108,7 @@
           <a:p>
             <a:fld id="{8D698CF4-9CDE-495D-BBD8-B9B442904B8E}" type="datetimeFigureOut">
               <a:rPr lang="en-NZ" smtClean="0"/>
-              <a:t>6/07/2023</a:t>
+              <a:t>21/11/2025</a:t>
             </a:fld>
             <a:endParaRPr lang="en-NZ"/>
           </a:p>
@@ -2362,7 +2361,7 @@
           <a:p>
             <a:fld id="{8D698CF4-9CDE-495D-BBD8-B9B442904B8E}" type="datetimeFigureOut">
               <a:rPr lang="en-NZ" smtClean="0"/>
-              <a:t>6/07/2023</a:t>
+              <a:t>21/11/2025</a:t>
             </a:fld>
             <a:endParaRPr lang="en-NZ"/>
           </a:p>
@@ -2575,7 +2574,7 @@
           <a:p>
             <a:fld id="{8D698CF4-9CDE-495D-BBD8-B9B442904B8E}" type="datetimeFigureOut">
               <a:rPr lang="en-NZ" smtClean="0"/>
-              <a:t>6/07/2023</a:t>
+              <a:t>21/11/2025</a:t>
             </a:fld>
             <a:endParaRPr lang="en-NZ"/>
           </a:p>
@@ -3279,44 +3278,6 @@
           <a:chExt cx="0" cy="0"/>
         </a:xfrm>
       </p:grpSpPr>
-      <p:sp>
-        <p:nvSpPr>
-          <p:cNvPr id="2" name="Title 1"/>
-          <p:cNvSpPr>
-            <a:spLocks noGrp="1"/>
-          </p:cNvSpPr>
-          <p:nvPr>
-            <p:ph type="title"/>
-          </p:nvPr>
-        </p:nvSpPr>
-        <p:spPr/>
-        <p:txBody>
-          <a:bodyPr/>
-          <a:lstStyle/>
-          <a:p>
-            <a:endParaRPr lang="en-NZ"/>
-          </a:p>
-        </p:txBody>
-      </p:sp>
-      <p:sp>
-        <p:nvSpPr>
-          <p:cNvPr id="3" name="Content Placeholder 2"/>
-          <p:cNvSpPr>
-            <a:spLocks noGrp="1"/>
-          </p:cNvSpPr>
-          <p:nvPr>
-            <p:ph idx="1"/>
-          </p:nvPr>
-        </p:nvSpPr>
-        <p:spPr/>
-        <p:txBody>
-          <a:bodyPr/>
-          <a:lstStyle/>
-          <a:p>
-            <a:endParaRPr lang="en-NZ"/>
-          </a:p>
-        </p:txBody>
-      </p:sp>
       <p:grpSp>
         <p:nvGrpSpPr>
           <p:cNvPr id="4" name="Group 3"/>
@@ -3424,12 +3385,12 @@
             <a:lstStyle/>
             <a:p>
               <a:r>
-                <a:rPr lang="en-NZ" sz="6600" b="1" dirty="0">
+                <a:rPr lang="en-NZ" sz="6200" b="1" dirty="0">
                   <a:solidFill>
                     <a:schemeClr val="tx1"/>
                   </a:solidFill>
-                  <a:latin typeface="Lato Light" panose="020F0502020204030203" pitchFamily="34" charset="0"/>
-                  <a:ea typeface="Lato Light" panose="020F0502020204030203" pitchFamily="34" charset="0"/>
+                  <a:latin typeface="Inter 18pt Medium" panose="02000503000000020004" pitchFamily="2" charset="0"/>
+                  <a:ea typeface="Inter 18pt Medium" panose="02000503000000020004" pitchFamily="2" charset="0"/>
                   <a:cs typeface="Lato Light" panose="020F0502020204030203" pitchFamily="34" charset="0"/>
                 </a:rPr>
                 <a:t>Low Vision Simulator</a:t>
@@ -3533,7 +3494,7 @@
             <a:lstStyle/>
             <a:p>
               <a:r>
-                <a:rPr lang="en-NZ" sz="6600" b="1" dirty="0" err="1">
+                <a:rPr lang="en-NZ" sz="8000" b="1" dirty="0" err="1">
                   <a:solidFill>
                     <a:schemeClr val="tx1"/>
                   </a:solidFill>
@@ -3544,7 +3505,7 @@
                 <a:t>Virtualeyes</a:t>
               </a:r>
               <a:r>
-                <a:rPr lang="en-NZ" sz="6600" b="1" dirty="0">
+                <a:rPr lang="en-NZ" sz="8000" b="1" dirty="0">
                   <a:solidFill>
                     <a:schemeClr val="tx1"/>
                   </a:solidFill>
@@ -3603,13 +3564,22 @@
           <a:bodyPr/>
           <a:lstStyle/>
           <a:p>
-            <a:endParaRPr lang="en-NZ"/>
+            <a:r>
+              <a:rPr lang="en-NZ" dirty="0"/>
+              <a:t>Transparent including text</a:t>
+            </a:r>
           </a:p>
         </p:txBody>
       </p:sp>
       <p:pic>
         <p:nvPicPr>
-          <p:cNvPr id="4" name="Content Placeholder 3"/>
+          <p:cNvPr id="13" name="Content Placeholder 12" descr="A logo with a black background&#10;&#10;AI-generated content may be incorrect.">
+            <a:extLst>
+              <a:ext uri="{FF2B5EF4-FFF2-40B4-BE49-F238E27FC236}">
+                <a16:creationId xmlns:a16="http://schemas.microsoft.com/office/drawing/2014/main" id="{89D9431F-2122-2560-1A6F-201FD08E0B8F}"/>
+              </a:ext>
+            </a:extLst>
+          </p:cNvPr>
           <p:cNvPicPr>
             <a:picLocks noGrp="1" noChangeAspect="1"/>
           </p:cNvPicPr>
@@ -3618,7 +3588,7 @@
           </p:nvPr>
         </p:nvPicPr>
         <p:blipFill>
-          <a:blip r:embed="rId2">
+          <a:blip r:embed="rId2" cstate="print">
             <a:clrChange>
               <a:clrFrom>
                 <a:srgbClr val="FFFFFF"/>
@@ -3641,8 +3611,8 @@
         </p:blipFill>
         <p:spPr>
           <a:xfrm>
-            <a:off x="838200" y="2485321"/>
-            <a:ext cx="10515600" cy="3031946"/>
+            <a:off x="1390950" y="1826109"/>
+            <a:ext cx="9410099" cy="4350370"/>
           </a:xfrm>
         </p:spPr>
       </p:pic>
@@ -3691,13 +3661,131 @@
           <a:bodyPr/>
           <a:lstStyle/>
           <a:p>
-            <a:endParaRPr lang="en-NZ"/>
+            <a:r>
+              <a:rPr lang="en-NZ" dirty="0"/>
+              <a:t>Transparent including text</a:t>
+            </a:r>
           </a:p>
         </p:txBody>
       </p:sp>
       <p:pic>
         <p:nvPicPr>
-          <p:cNvPr id="4" name="Content Placeholder 3"/>
+          <p:cNvPr id="7" name="Content Placeholder 6" descr="A black text on a white background&#10;&#10;AI-generated content may be incorrect.">
+            <a:extLst>
+              <a:ext uri="{FF2B5EF4-FFF2-40B4-BE49-F238E27FC236}">
+                <a16:creationId xmlns:a16="http://schemas.microsoft.com/office/drawing/2014/main" id="{9BC373EC-0F8C-5FD6-EBB6-4AE5AAF12807}"/>
+              </a:ext>
+            </a:extLst>
+          </p:cNvPr>
+          <p:cNvPicPr>
+            <a:picLocks noGrp="1" noChangeAspect="1"/>
+          </p:cNvPicPr>
+          <p:nvPr>
+            <p:ph idx="1"/>
+          </p:nvPr>
+        </p:nvPicPr>
+        <p:blipFill>
+          <a:blip r:embed="rId2" cstate="print">
+            <a:clrChange>
+              <a:clrFrom>
+                <a:srgbClr val="FFFFFF"/>
+              </a:clrFrom>
+              <a:clrTo>
+                <a:srgbClr val="FFFFFF">
+                  <a:alpha val="0"/>
+                </a:srgbClr>
+              </a:clrTo>
+            </a:clrChange>
+            <a:extLst>
+              <a:ext uri="{28A0092B-C50C-407E-A947-70E740481C1C}">
+                <a14:useLocalDpi xmlns:a14="http://schemas.microsoft.com/office/drawing/2010/main" val="0"/>
+              </a:ext>
+            </a:extLst>
+          </a:blip>
+          <a:stretch>
+            <a:fillRect/>
+          </a:stretch>
+        </p:blipFill>
+        <p:spPr>
+          <a:xfrm>
+            <a:off x="838200" y="2688650"/>
+            <a:ext cx="10515600" cy="2625287"/>
+          </a:xfrm>
+        </p:spPr>
+      </p:pic>
+    </p:spTree>
+    <p:extLst>
+      <p:ext uri="{BB962C8B-B14F-4D97-AF65-F5344CB8AC3E}">
+        <p14:creationId xmlns:p14="http://schemas.microsoft.com/office/powerpoint/2010/main" val="2023830378"/>
+      </p:ext>
+    </p:extLst>
+  </p:cSld>
+  <p:clrMapOvr>
+    <a:masterClrMapping/>
+  </p:clrMapOvr>
+</p:sld>
+</file>
+
+<file path=ppt/slides/slide6.xml><?xml version="1.0" encoding="utf-8"?>
+<p:sld xmlns:a="http://schemas.openxmlformats.org/drawingml/2006/main" xmlns:r="http://schemas.openxmlformats.org/officeDocument/2006/relationships" xmlns:p="http://schemas.openxmlformats.org/presentationml/2006/main">
+  <p:cSld>
+    <p:spTree>
+      <p:nvGrpSpPr>
+        <p:cNvPr id="1" name="">
+          <a:extLst>
+            <a:ext uri="{FF2B5EF4-FFF2-40B4-BE49-F238E27FC236}">
+              <a16:creationId xmlns:a16="http://schemas.microsoft.com/office/drawing/2014/main" id="{7FE685DC-395E-5C86-DA7C-44C8B1A63FF2}"/>
+            </a:ext>
+          </a:extLst>
+        </p:cNvPr>
+        <p:cNvGrpSpPr/>
+        <p:nvPr/>
+      </p:nvGrpSpPr>
+      <p:grpSpPr>
+        <a:xfrm>
+          <a:off x="0" y="0"/>
+          <a:ext cx="0" cy="0"/>
+          <a:chOff x="0" y="0"/>
+          <a:chExt cx="0" cy="0"/>
+        </a:xfrm>
+      </p:grpSpPr>
+      <p:sp>
+        <p:nvSpPr>
+          <p:cNvPr id="2" name="Title 1">
+            <a:extLst>
+              <a:ext uri="{FF2B5EF4-FFF2-40B4-BE49-F238E27FC236}">
+                <a16:creationId xmlns:a16="http://schemas.microsoft.com/office/drawing/2014/main" id="{9A3CA734-28F9-179D-73D1-3711907B3C6B}"/>
+              </a:ext>
+            </a:extLst>
+          </p:cNvPr>
+          <p:cNvSpPr>
+            <a:spLocks noGrp="1"/>
+          </p:cNvSpPr>
+          <p:nvPr>
+            <p:ph type="title"/>
+          </p:nvPr>
+        </p:nvSpPr>
+        <p:spPr/>
+        <p:txBody>
+          <a:bodyPr/>
+          <a:lstStyle/>
+          <a:p>
+            <a:r>
+              <a:rPr lang="en-NZ" dirty="0"/>
+              <a:t>Transparent including text</a:t>
+            </a:r>
+          </a:p>
+        </p:txBody>
+      </p:sp>
+      <p:pic>
+        <p:nvPicPr>
+          <p:cNvPr id="6" name="Content Placeholder 5" descr="A logo with text on it&#10;&#10;AI-generated content may be incorrect.">
+            <a:extLst>
+              <a:ext uri="{FF2B5EF4-FFF2-40B4-BE49-F238E27FC236}">
+                <a16:creationId xmlns:a16="http://schemas.microsoft.com/office/drawing/2014/main" id="{92947A66-9C3D-C23C-435B-A6F82C7C8CFB}"/>
+              </a:ext>
+            </a:extLst>
+          </p:cNvPr>
           <p:cNvPicPr>
             <a:picLocks noGrp="1" noChangeAspect="1"/>
           </p:cNvPicPr>
@@ -3729,179 +3817,15 @@
         </p:blipFill>
         <p:spPr>
           <a:xfrm>
-            <a:off x="838200" y="2708696"/>
-            <a:ext cx="10515600" cy="2585195"/>
+            <a:off x="3838575" y="3048794"/>
+            <a:ext cx="4514850" cy="1905000"/>
           </a:xfrm>
         </p:spPr>
       </p:pic>
     </p:spTree>
     <p:extLst>
       <p:ext uri="{BB962C8B-B14F-4D97-AF65-F5344CB8AC3E}">
-        <p14:creationId xmlns:p14="http://schemas.microsoft.com/office/powerpoint/2010/main" val="2023830378"/>
-      </p:ext>
-    </p:extLst>
-  </p:cSld>
-  <p:clrMapOvr>
-    <a:masterClrMapping/>
-  </p:clrMapOvr>
-</p:sld>
-</file>
-
-<file path=ppt/slides/slide6.xml><?xml version="1.0" encoding="utf-8"?>
-<p:sld xmlns:a="http://schemas.openxmlformats.org/drawingml/2006/main" xmlns:r="http://schemas.openxmlformats.org/officeDocument/2006/relationships" xmlns:p="http://schemas.openxmlformats.org/presentationml/2006/main">
-  <p:cSld>
-    <p:spTree>
-      <p:nvGrpSpPr>
-        <p:cNvPr id="1" name=""/>
-        <p:cNvGrpSpPr/>
-        <p:nvPr/>
-      </p:nvGrpSpPr>
-      <p:grpSpPr>
-        <a:xfrm>
-          <a:off x="0" y="0"/>
-          <a:ext cx="0" cy="0"/>
-          <a:chOff x="0" y="0"/>
-          <a:chExt cx="0" cy="0"/>
-        </a:xfrm>
-      </p:grpSpPr>
-      <p:grpSp>
-        <p:nvGrpSpPr>
-          <p:cNvPr id="2" name="Group 1"/>
-          <p:cNvGrpSpPr/>
-          <p:nvPr/>
-        </p:nvGrpSpPr>
-        <p:grpSpPr>
-          <a:xfrm>
-            <a:off x="3109790" y="884255"/>
-            <a:ext cx="5829300" cy="4803113"/>
-            <a:chOff x="-95634" y="1326382"/>
-            <a:chExt cx="5829300" cy="4803113"/>
-          </a:xfrm>
-        </p:grpSpPr>
-        <p:pic>
-          <p:nvPicPr>
-            <p:cNvPr id="1026" name="Picture 2" descr="https://media.istockphoto.com/vectors/eye-icon-vector-id940031162?k=6&amp;m=940031162&amp;s=612x612&amp;w=0&amp;h=e2mQ4XAeH5vsEYUP4-zzPyTAH_J28squMbxXfL58V2A="/>
-            <p:cNvPicPr>
-              <a:picLocks noChangeAspect="1" noChangeArrowheads="1"/>
-            </p:cNvPicPr>
-            <p:nvPr/>
-          </p:nvPicPr>
-          <p:blipFill rotWithShape="1">
-            <a:blip r:embed="rId2">
-              <a:clrChange>
-                <a:clrFrom>
-                  <a:srgbClr val="F8F8F8"/>
-                </a:clrFrom>
-                <a:clrTo>
-                  <a:srgbClr val="F8F8F8">
-                    <a:alpha val="0"/>
-                  </a:srgbClr>
-                </a:clrTo>
-              </a:clrChange>
-              <a:extLst>
-                <a:ext uri="{28A0092B-C50C-407E-A947-70E740481C1C}">
-                  <a14:useLocalDpi xmlns:a14="http://schemas.microsoft.com/office/drawing/2010/main" val="0"/>
-                </a:ext>
-              </a:extLst>
-            </a:blip>
-            <a:srcRect t="18929" b="20050"/>
-            <a:stretch/>
-          </p:blipFill>
-          <p:spPr bwMode="auto">
-            <a:xfrm>
-              <a:off x="-95634" y="1326382"/>
-              <a:ext cx="5829300" cy="3557117"/>
-            </a:xfrm>
-            <a:prstGeom prst="rect">
-              <a:avLst/>
-            </a:prstGeom>
-            <a:noFill/>
-            <a:extLst>
-              <a:ext uri="{909E8E84-426E-40DD-AFC4-6F175D3DCCD1}">
-                <a14:hiddenFill xmlns:a14="http://schemas.microsoft.com/office/drawing/2010/main">
-                  <a:solidFill>
-                    <a:srgbClr val="FFFFFF"/>
-                  </a:solidFill>
-                </a14:hiddenFill>
-              </a:ext>
-            </a:extLst>
-          </p:spPr>
-        </p:pic>
-        <p:sp>
-          <p:nvSpPr>
-            <p:cNvPr id="6" name="Rectangle 5"/>
-            <p:cNvSpPr/>
-            <p:nvPr/>
-          </p:nvSpPr>
-          <p:spPr>
-            <a:xfrm>
-              <a:off x="509197" y="4883499"/>
-              <a:ext cx="4619637" cy="1245996"/>
-            </a:xfrm>
-            <a:prstGeom prst="rect">
-              <a:avLst/>
-            </a:prstGeom>
-            <a:solidFill>
-              <a:schemeClr val="bg1"/>
-            </a:solidFill>
-            <a:ln>
-              <a:noFill/>
-            </a:ln>
-          </p:spPr>
-          <p:style>
-            <a:lnRef idx="2">
-              <a:schemeClr val="accent1">
-                <a:shade val="50000"/>
-              </a:schemeClr>
-            </a:lnRef>
-            <a:fillRef idx="1">
-              <a:schemeClr val="accent1"/>
-            </a:fillRef>
-            <a:effectRef idx="0">
-              <a:schemeClr val="accent1"/>
-            </a:effectRef>
-            <a:fontRef idx="minor">
-              <a:schemeClr val="lt1"/>
-            </a:fontRef>
-          </p:style>
-          <p:txBody>
-            <a:bodyPr rtlCol="0" anchor="ctr"/>
-            <a:lstStyle/>
-            <a:p>
-              <a:pPr algn="ctr"/>
-              <a:r>
-                <a:rPr lang="en-NZ" sz="6600" b="1" dirty="0">
-                  <a:solidFill>
-                    <a:schemeClr val="tx1"/>
-                  </a:solidFill>
-                  <a:latin typeface="Lato Light" panose="020F0502020204030203" pitchFamily="34" charset="0"/>
-                  <a:ea typeface="Lato Light" panose="020F0502020204030203" pitchFamily="34" charset="0"/>
-                  <a:cs typeface="Lato Light" panose="020F0502020204030203" pitchFamily="34" charset="0"/>
-                </a:rPr>
-                <a:t>Low Vision </a:t>
-              </a:r>
-            </a:p>
-            <a:p>
-              <a:pPr algn="ctr"/>
-              <a:r>
-                <a:rPr lang="en-NZ" sz="6600" b="1" dirty="0">
-                  <a:solidFill>
-                    <a:schemeClr val="tx1"/>
-                  </a:solidFill>
-                  <a:latin typeface="Lato Light" panose="020F0502020204030203" pitchFamily="34" charset="0"/>
-                  <a:ea typeface="Lato Light" panose="020F0502020204030203" pitchFamily="34" charset="0"/>
-                  <a:cs typeface="Lato Light" panose="020F0502020204030203" pitchFamily="34" charset="0"/>
-                </a:rPr>
-                <a:t>Simulator</a:t>
-              </a:r>
-            </a:p>
-          </p:txBody>
-        </p:sp>
-      </p:grpSp>
-    </p:spTree>
-    <p:extLst>
-      <p:ext uri="{BB962C8B-B14F-4D97-AF65-F5344CB8AC3E}">
-        <p14:creationId xmlns:p14="http://schemas.microsoft.com/office/powerpoint/2010/main" val="1488925075"/>
+        <p14:creationId xmlns:p14="http://schemas.microsoft.com/office/powerpoint/2010/main" val="2833405942"/>
       </p:ext>
     </p:extLst>
   </p:cSld>
@@ -3912,94 +3836,6 @@
 </file>
 
 <file path=ppt/slides/slide7.xml><?xml version="1.0" encoding="utf-8"?>
-<p:sld xmlns:a="http://schemas.openxmlformats.org/drawingml/2006/main" xmlns:r="http://schemas.openxmlformats.org/officeDocument/2006/relationships" xmlns:p="http://schemas.openxmlformats.org/presentationml/2006/main">
-  <p:cSld>
-    <p:spTree>
-      <p:nvGrpSpPr>
-        <p:cNvPr id="1" name=""/>
-        <p:cNvGrpSpPr/>
-        <p:nvPr/>
-      </p:nvGrpSpPr>
-      <p:grpSpPr>
-        <a:xfrm>
-          <a:off x="0" y="0"/>
-          <a:ext cx="0" cy="0"/>
-          <a:chOff x="0" y="0"/>
-          <a:chExt cx="0" cy="0"/>
-        </a:xfrm>
-      </p:grpSpPr>
-      <p:sp>
-        <p:nvSpPr>
-          <p:cNvPr id="2" name="Title 1"/>
-          <p:cNvSpPr>
-            <a:spLocks noGrp="1"/>
-          </p:cNvSpPr>
-          <p:nvPr>
-            <p:ph type="title"/>
-          </p:nvPr>
-        </p:nvSpPr>
-        <p:spPr/>
-        <p:txBody>
-          <a:bodyPr/>
-          <a:lstStyle/>
-          <a:p>
-            <a:endParaRPr lang="en-NZ"/>
-          </a:p>
-        </p:txBody>
-      </p:sp>
-      <p:pic>
-        <p:nvPicPr>
-          <p:cNvPr id="4" name="Content Placeholder 3"/>
-          <p:cNvPicPr>
-            <a:picLocks noGrp="1" noChangeAspect="1"/>
-          </p:cNvPicPr>
-          <p:nvPr>
-            <p:ph idx="1"/>
-          </p:nvPr>
-        </p:nvPicPr>
-        <p:blipFill>
-          <a:blip r:embed="rId2">
-            <a:clrChange>
-              <a:clrFrom>
-                <a:srgbClr val="FFFFFF"/>
-              </a:clrFrom>
-              <a:clrTo>
-                <a:srgbClr val="FFFFFF">
-                  <a:alpha val="0"/>
-                </a:srgbClr>
-              </a:clrTo>
-            </a:clrChange>
-            <a:extLst>
-              <a:ext uri="{28A0092B-C50C-407E-A947-70E740481C1C}">
-                <a14:useLocalDpi xmlns:a14="http://schemas.microsoft.com/office/drawing/2010/main" val="0"/>
-              </a:ext>
-            </a:extLst>
-          </a:blip>
-          <a:stretch>
-            <a:fillRect/>
-          </a:stretch>
-        </p:blipFill>
-        <p:spPr>
-          <a:xfrm>
-            <a:off x="3527440" y="1463884"/>
-            <a:ext cx="4453831" cy="4351338"/>
-          </a:xfrm>
-        </p:spPr>
-      </p:pic>
-    </p:spTree>
-    <p:extLst>
-      <p:ext uri="{BB962C8B-B14F-4D97-AF65-F5344CB8AC3E}">
-        <p14:creationId xmlns:p14="http://schemas.microsoft.com/office/powerpoint/2010/main" val="2892056377"/>
-      </p:ext>
-    </p:extLst>
-  </p:cSld>
-  <p:clrMapOvr>
-    <a:masterClrMapping/>
-  </p:clrMapOvr>
-</p:sld>
-</file>
-
-<file path=ppt/slides/slide8.xml><?xml version="1.0" encoding="utf-8"?>
 <p:sld xmlns:a="http://schemas.openxmlformats.org/drawingml/2006/main" xmlns:r="http://schemas.openxmlformats.org/officeDocument/2006/relationships" xmlns:p="http://schemas.openxmlformats.org/presentationml/2006/main">
   <p:cSld>
     <p:bg>
@@ -4158,7 +3994,7 @@
 </p:sld>
 </file>
 
-<file path=ppt/slides/slide9.xml><?xml version="1.0" encoding="utf-8"?>
+<file path=ppt/slides/slide8.xml><?xml version="1.0" encoding="utf-8"?>
 <p:sld xmlns:a="http://schemas.openxmlformats.org/drawingml/2006/main" xmlns:r="http://schemas.openxmlformats.org/officeDocument/2006/relationships" xmlns:p="http://schemas.openxmlformats.org/presentationml/2006/main">
   <p:cSld>
     <p:spTree>
@@ -4200,46 +4036,23 @@
           </a:p>
         </p:txBody>
       </p:sp>
-      <p:sp>
-        <p:nvSpPr>
-          <p:cNvPr id="3" name="Content Placeholder 2">
+      <p:pic>
+        <p:nvPicPr>
+          <p:cNvPr id="10" name="Content Placeholder 9" descr="A black and blue cartoon of a binocular&#10;&#10;AI-generated content may be incorrect.">
             <a:extLst>
               <a:ext uri="{FF2B5EF4-FFF2-40B4-BE49-F238E27FC236}">
-                <a16:creationId xmlns:a16="http://schemas.microsoft.com/office/drawing/2014/main" id="{6790FB1A-53D0-05A2-C9A9-A7B5650BE588}"/>
-              </a:ext>
-            </a:extLst>
-          </p:cNvPr>
-          <p:cNvSpPr>
-            <a:spLocks noGrp="1"/>
-          </p:cNvSpPr>
-          <p:nvPr>
-            <p:ph idx="1"/>
-          </p:nvPr>
-        </p:nvSpPr>
-        <p:spPr/>
-        <p:txBody>
-          <a:bodyPr/>
-          <a:lstStyle/>
-          <a:p>
-            <a:endParaRPr lang="en-NZ" dirty="0"/>
-          </a:p>
-        </p:txBody>
-      </p:sp>
-      <p:pic>
-        <p:nvPicPr>
-          <p:cNvPr id="4" name="Content Placeholder 3">
-            <a:extLst>
-              <a:ext uri="{FF2B5EF4-FFF2-40B4-BE49-F238E27FC236}">
-                <a16:creationId xmlns:a16="http://schemas.microsoft.com/office/drawing/2014/main" id="{85D18E8B-867C-41AD-3E2C-DD3164850694}"/>
+                <a16:creationId xmlns:a16="http://schemas.microsoft.com/office/drawing/2014/main" id="{62AAD8DB-76C5-35C3-85D7-3AC5786E39D5}"/>
               </a:ext>
             </a:extLst>
           </p:cNvPr>
           <p:cNvPicPr>
-            <a:picLocks noChangeAspect="1"/>
+            <a:picLocks noGrp="1" noChangeAspect="1"/>
           </p:cNvPicPr>
-          <p:nvPr/>
+          <p:nvPr>
+            <p:ph idx="1"/>
+          </p:nvPr>
         </p:nvPicPr>
-        <p:blipFill rotWithShape="1">
+        <p:blipFill>
           <a:blip r:embed="rId2">
             <a:clrChange>
               <a:clrFrom>
@@ -4257,17 +4070,15 @@
               </a:ext>
             </a:extLst>
           </a:blip>
-          <a:srcRect r="63303"/>
-          <a:stretch/>
+          <a:stretch>
+            <a:fillRect/>
+          </a:stretch>
         </p:blipFill>
         <p:spPr>
           <a:xfrm>
-            <a:off x="838200" y="1690688"/>
-            <a:ext cx="6063114" cy="4061836"/>
+            <a:off x="2832496" y="1825625"/>
+            <a:ext cx="6527007" cy="4351338"/>
           </a:xfrm>
-          <a:prstGeom prst="rect">
-            <a:avLst/>
-          </a:prstGeom>
         </p:spPr>
       </p:pic>
     </p:spTree>

</xml_diff>